<commit_message>
Draft without class diagram
</commit_message>
<xml_diff>
--- a/Milestone#2 Reportouts/UMLDiagrams.pptx
+++ b/Milestone#2 Reportouts/UMLDiagrams.pptx
@@ -6366,8 +6366,8 @@
         </p:nvSpPr>
         <p:spPr>
           <a:xfrm rot="20889868">
-            <a:off x="5493776" y="2527121"/>
-            <a:ext cx="1688154" cy="338554"/>
+            <a:off x="5310745" y="2527121"/>
+            <a:ext cx="2054217" cy="338554"/>
           </a:xfrm>
           <a:prstGeom prst="rect">
             <a:avLst/>
@@ -6382,7 +6382,15 @@
           <a:p>
             <a:r>
               <a:rPr lang="en-US" sz="1600" dirty="0"/>
-              <a:t>1.2[random]:list() </a:t>
+              <a:t>1.2[random]:</a:t>
+            </a:r>
+            <a:r>
+              <a:rPr lang="en-US" sz="1600" dirty="0" err="1"/>
+              <a:t>listView</a:t>
+            </a:r>
+            <a:r>
+              <a:rPr lang="en-US" sz="1600" dirty="0"/>
+              <a:t>()</a:t>
             </a:r>
           </a:p>
         </p:txBody>
@@ -7460,6 +7468,812 @@
           </a:p>
         </p:txBody>
       </p:sp>
+      <p:sp>
+        <p:nvSpPr>
+          <p:cNvPr id="5" name="Rectangle 4">
+            <a:extLst>
+              <a:ext uri="{FF2B5EF4-FFF2-40B4-BE49-F238E27FC236}">
+                <a16:creationId xmlns:a16="http://schemas.microsoft.com/office/drawing/2014/main" id="{36ED1650-1808-AD4A-9DE0-BC0A6EE11F45}"/>
+              </a:ext>
+            </a:extLst>
+          </p:cNvPr>
+          <p:cNvSpPr/>
+          <p:nvPr/>
+        </p:nvSpPr>
+        <p:spPr>
+          <a:xfrm>
+            <a:off x="1126541" y="1126541"/>
+            <a:ext cx="1294790" cy="570585"/>
+          </a:xfrm>
+          <a:prstGeom prst="rect">
+            <a:avLst/>
+          </a:prstGeom>
+        </p:spPr>
+        <p:style>
+          <a:lnRef idx="2">
+            <a:schemeClr val="accent1">
+              <a:shade val="50000"/>
+            </a:schemeClr>
+          </a:lnRef>
+          <a:fillRef idx="1">
+            <a:schemeClr val="accent1"/>
+          </a:fillRef>
+          <a:effectRef idx="0">
+            <a:schemeClr val="accent1"/>
+          </a:effectRef>
+          <a:fontRef idx="minor">
+            <a:schemeClr val="lt1"/>
+          </a:fontRef>
+        </p:style>
+        <p:txBody>
+          <a:bodyPr rtlCol="0" anchor="ctr"/>
+          <a:lstStyle/>
+          <a:p>
+            <a:pPr algn="ctr"/>
+            <a:r>
+              <a:rPr lang="en-US" dirty="0"/>
+              <a:t>Searching</a:t>
+            </a:r>
+          </a:p>
+        </p:txBody>
+      </p:sp>
+      <p:sp>
+        <p:nvSpPr>
+          <p:cNvPr id="6" name="Rectangle 5">
+            <a:extLst>
+              <a:ext uri="{FF2B5EF4-FFF2-40B4-BE49-F238E27FC236}">
+                <a16:creationId xmlns:a16="http://schemas.microsoft.com/office/drawing/2014/main" id="{08346124-EF7A-3D42-898C-B15BB551BDD2}"/>
+              </a:ext>
+            </a:extLst>
+          </p:cNvPr>
+          <p:cNvSpPr/>
+          <p:nvPr/>
+        </p:nvSpPr>
+        <p:spPr>
+          <a:xfrm>
+            <a:off x="4835347" y="1126541"/>
+            <a:ext cx="1477671" cy="629107"/>
+          </a:xfrm>
+          <a:prstGeom prst="rect">
+            <a:avLst/>
+          </a:prstGeom>
+          <a:noFill/>
+          <a:ln>
+            <a:solidFill>
+              <a:schemeClr val="tx1"/>
+            </a:solidFill>
+          </a:ln>
+        </p:spPr>
+        <p:style>
+          <a:lnRef idx="2">
+            <a:schemeClr val="accent1">
+              <a:shade val="50000"/>
+            </a:schemeClr>
+          </a:lnRef>
+          <a:fillRef idx="1">
+            <a:schemeClr val="accent1"/>
+          </a:fillRef>
+          <a:effectRef idx="0">
+            <a:schemeClr val="accent1"/>
+          </a:effectRef>
+          <a:fontRef idx="minor">
+            <a:schemeClr val="lt1"/>
+          </a:fontRef>
+        </p:style>
+        <p:txBody>
+          <a:bodyPr rtlCol="0" anchor="ctr"/>
+          <a:lstStyle/>
+          <a:p>
+            <a:pPr algn="ctr"/>
+            <a:endParaRPr lang="en-US"/>
+          </a:p>
+        </p:txBody>
+      </p:sp>
+      <p:sp>
+        <p:nvSpPr>
+          <p:cNvPr id="13" name="TextBox 12">
+            <a:extLst>
+              <a:ext uri="{FF2B5EF4-FFF2-40B4-BE49-F238E27FC236}">
+                <a16:creationId xmlns:a16="http://schemas.microsoft.com/office/drawing/2014/main" id="{9F945C34-CE57-664F-AE9A-F980929EAEBA}"/>
+              </a:ext>
+            </a:extLst>
+          </p:cNvPr>
+          <p:cNvSpPr txBox="1"/>
+          <p:nvPr/>
+        </p:nvSpPr>
+        <p:spPr>
+          <a:xfrm>
+            <a:off x="5265443" y="1256428"/>
+            <a:ext cx="617477" cy="369332"/>
+          </a:xfrm>
+          <a:prstGeom prst="rect">
+            <a:avLst/>
+          </a:prstGeom>
+          <a:noFill/>
+        </p:spPr>
+        <p:txBody>
+          <a:bodyPr wrap="none" rtlCol="0">
+            <a:spAutoFit/>
+          </a:bodyPr>
+          <a:lstStyle/>
+          <a:p>
+            <a:r>
+              <a:rPr lang="en-US" dirty="0"/>
+              <a:t>User</a:t>
+            </a:r>
+          </a:p>
+        </p:txBody>
+      </p:sp>
+      <p:sp>
+        <p:nvSpPr>
+          <p:cNvPr id="14" name="Rectangle 13">
+            <a:extLst>
+              <a:ext uri="{FF2B5EF4-FFF2-40B4-BE49-F238E27FC236}">
+                <a16:creationId xmlns:a16="http://schemas.microsoft.com/office/drawing/2014/main" id="{A6E2A686-F534-6041-83AE-6BF8B0AF02B3}"/>
+              </a:ext>
+            </a:extLst>
+          </p:cNvPr>
+          <p:cNvSpPr/>
+          <p:nvPr/>
+        </p:nvSpPr>
+        <p:spPr>
+          <a:xfrm>
+            <a:off x="2131608" y="3875838"/>
+            <a:ext cx="1566673" cy="629107"/>
+          </a:xfrm>
+          <a:prstGeom prst="rect">
+            <a:avLst/>
+          </a:prstGeom>
+          <a:noFill/>
+          <a:ln>
+            <a:solidFill>
+              <a:schemeClr val="tx1"/>
+            </a:solidFill>
+          </a:ln>
+        </p:spPr>
+        <p:style>
+          <a:lnRef idx="2">
+            <a:schemeClr val="accent1">
+              <a:shade val="50000"/>
+            </a:schemeClr>
+          </a:lnRef>
+          <a:fillRef idx="1">
+            <a:schemeClr val="accent1"/>
+          </a:fillRef>
+          <a:effectRef idx="0">
+            <a:schemeClr val="accent1"/>
+          </a:effectRef>
+          <a:fontRef idx="minor">
+            <a:schemeClr val="lt1"/>
+          </a:fontRef>
+        </p:style>
+        <p:txBody>
+          <a:bodyPr rtlCol="0" anchor="ctr"/>
+          <a:lstStyle/>
+          <a:p>
+            <a:pPr algn="ctr"/>
+            <a:endParaRPr lang="en-US"/>
+          </a:p>
+        </p:txBody>
+      </p:sp>
+      <p:sp>
+        <p:nvSpPr>
+          <p:cNvPr id="15" name="TextBox 14">
+            <a:extLst>
+              <a:ext uri="{FF2B5EF4-FFF2-40B4-BE49-F238E27FC236}">
+                <a16:creationId xmlns:a16="http://schemas.microsoft.com/office/drawing/2014/main" id="{9BB2697C-4829-2648-8A1C-E71C08EDAD8E}"/>
+              </a:ext>
+            </a:extLst>
+          </p:cNvPr>
+          <p:cNvSpPr txBox="1"/>
+          <p:nvPr/>
+        </p:nvSpPr>
+        <p:spPr>
+          <a:xfrm>
+            <a:off x="2302436" y="4005725"/>
+            <a:ext cx="1225015" cy="369332"/>
+          </a:xfrm>
+          <a:prstGeom prst="rect">
+            <a:avLst/>
+          </a:prstGeom>
+          <a:noFill/>
+        </p:spPr>
+        <p:txBody>
+          <a:bodyPr wrap="none" rtlCol="0">
+            <a:spAutoFit/>
+          </a:bodyPr>
+          <a:lstStyle/>
+          <a:p>
+            <a:r>
+              <a:rPr lang="en-US" dirty="0"/>
+              <a:t>Find Places</a:t>
+            </a:r>
+          </a:p>
+        </p:txBody>
+      </p:sp>
+      <p:cxnSp>
+        <p:nvCxnSpPr>
+          <p:cNvPr id="17" name="Straight Arrow Connector 16">
+            <a:extLst>
+              <a:ext uri="{FF2B5EF4-FFF2-40B4-BE49-F238E27FC236}">
+                <a16:creationId xmlns:a16="http://schemas.microsoft.com/office/drawing/2014/main" id="{961BF661-1E22-7948-8F49-CC71EE350D52}"/>
+              </a:ext>
+            </a:extLst>
+          </p:cNvPr>
+          <p:cNvCxnSpPr>
+            <a:cxnSpLocks/>
+            <a:endCxn id="14" idx="0"/>
+          </p:cNvCxnSpPr>
+          <p:nvPr/>
+        </p:nvCxnSpPr>
+        <p:spPr>
+          <a:xfrm flipH="1">
+            <a:off x="2914945" y="1755648"/>
+            <a:ext cx="1920400" cy="2120190"/>
+          </a:xfrm>
+          <a:prstGeom prst="straightConnector1">
+            <a:avLst/>
+          </a:prstGeom>
+          <a:ln w="19050">
+            <a:solidFill>
+              <a:schemeClr val="accent1"/>
+            </a:solidFill>
+            <a:headEnd type="none" w="med" len="med"/>
+            <a:tailEnd type="arrow" w="med" len="med"/>
+          </a:ln>
+        </p:spPr>
+        <p:style>
+          <a:lnRef idx="1">
+            <a:schemeClr val="accent1"/>
+          </a:lnRef>
+          <a:fillRef idx="0">
+            <a:schemeClr val="accent1"/>
+          </a:fillRef>
+          <a:effectRef idx="0">
+            <a:schemeClr val="accent1"/>
+          </a:effectRef>
+          <a:fontRef idx="minor">
+            <a:schemeClr val="tx1"/>
+          </a:fontRef>
+        </p:style>
+      </p:cxnSp>
+      <p:sp>
+        <p:nvSpPr>
+          <p:cNvPr id="18" name="TextBox 17">
+            <a:extLst>
+              <a:ext uri="{FF2B5EF4-FFF2-40B4-BE49-F238E27FC236}">
+                <a16:creationId xmlns:a16="http://schemas.microsoft.com/office/drawing/2014/main" id="{8ACABBB4-0C80-0D4E-8EE7-3A3B3CDFD0C9}"/>
+              </a:ext>
+            </a:extLst>
+          </p:cNvPr>
+          <p:cNvSpPr txBox="1"/>
+          <p:nvPr/>
+        </p:nvSpPr>
+        <p:spPr>
+          <a:xfrm rot="18729099">
+            <a:off x="2314112" y="2442934"/>
+            <a:ext cx="2882777" cy="369332"/>
+          </a:xfrm>
+          <a:prstGeom prst="rect">
+            <a:avLst/>
+          </a:prstGeom>
+          <a:noFill/>
+        </p:spPr>
+        <p:txBody>
+          <a:bodyPr wrap="none" rtlCol="0">
+            <a:spAutoFit/>
+          </a:bodyPr>
+          <a:lstStyle/>
+          <a:p>
+            <a:r>
+              <a:rPr lang="en-US" dirty="0"/>
+              <a:t>Search with current location </a:t>
+            </a:r>
+          </a:p>
+        </p:txBody>
+      </p:sp>
+      <p:sp>
+        <p:nvSpPr>
+          <p:cNvPr id="21" name="Rectangle 20">
+            <a:extLst>
+              <a:ext uri="{FF2B5EF4-FFF2-40B4-BE49-F238E27FC236}">
+                <a16:creationId xmlns:a16="http://schemas.microsoft.com/office/drawing/2014/main" id="{5D657B7F-9BDC-C540-8E42-DCAF7CEF4983}"/>
+              </a:ext>
+            </a:extLst>
+          </p:cNvPr>
+          <p:cNvSpPr/>
+          <p:nvPr/>
+        </p:nvSpPr>
+        <p:spPr>
+          <a:xfrm>
+            <a:off x="4859716" y="3875838"/>
+            <a:ext cx="1826377" cy="629107"/>
+          </a:xfrm>
+          <a:prstGeom prst="rect">
+            <a:avLst/>
+          </a:prstGeom>
+          <a:noFill/>
+          <a:ln>
+            <a:solidFill>
+              <a:schemeClr val="tx1"/>
+            </a:solidFill>
+          </a:ln>
+        </p:spPr>
+        <p:style>
+          <a:lnRef idx="2">
+            <a:schemeClr val="accent1">
+              <a:shade val="50000"/>
+            </a:schemeClr>
+          </a:lnRef>
+          <a:fillRef idx="1">
+            <a:schemeClr val="accent1"/>
+          </a:fillRef>
+          <a:effectRef idx="0">
+            <a:schemeClr val="accent1"/>
+          </a:effectRef>
+          <a:fontRef idx="minor">
+            <a:schemeClr val="lt1"/>
+          </a:fontRef>
+        </p:style>
+        <p:txBody>
+          <a:bodyPr rtlCol="0" anchor="ctr"/>
+          <a:lstStyle/>
+          <a:p>
+            <a:pPr algn="ctr"/>
+            <a:endParaRPr lang="en-US"/>
+          </a:p>
+        </p:txBody>
+      </p:sp>
+      <p:sp>
+        <p:nvSpPr>
+          <p:cNvPr id="22" name="TextBox 21">
+            <a:extLst>
+              <a:ext uri="{FF2B5EF4-FFF2-40B4-BE49-F238E27FC236}">
+                <a16:creationId xmlns:a16="http://schemas.microsoft.com/office/drawing/2014/main" id="{8C544BC7-7DE2-3644-BB72-7A9F0490A775}"/>
+              </a:ext>
+            </a:extLst>
+          </p:cNvPr>
+          <p:cNvSpPr txBox="1"/>
+          <p:nvPr/>
+        </p:nvSpPr>
+        <p:spPr>
+          <a:xfrm>
+            <a:off x="5006220" y="3911135"/>
+            <a:ext cx="1533368" cy="646331"/>
+          </a:xfrm>
+          <a:prstGeom prst="rect">
+            <a:avLst/>
+          </a:prstGeom>
+          <a:noFill/>
+        </p:spPr>
+        <p:txBody>
+          <a:bodyPr wrap="none" rtlCol="0">
+            <a:spAutoFit/>
+          </a:bodyPr>
+          <a:lstStyle/>
+          <a:p>
+            <a:pPr algn="ctr"/>
+            <a:r>
+              <a:rPr lang="en-US" dirty="0"/>
+              <a:t>Search Results</a:t>
+            </a:r>
+            <a:br>
+              <a:rPr lang="en-US" dirty="0"/>
+            </a:br>
+            <a:r>
+              <a:rPr lang="en-US" dirty="0"/>
+              <a:t>(List)</a:t>
+            </a:r>
+          </a:p>
+        </p:txBody>
+      </p:sp>
+      <p:sp>
+        <p:nvSpPr>
+          <p:cNvPr id="23" name="Rectangle 22">
+            <a:extLst>
+              <a:ext uri="{FF2B5EF4-FFF2-40B4-BE49-F238E27FC236}">
+                <a16:creationId xmlns:a16="http://schemas.microsoft.com/office/drawing/2014/main" id="{9C07CE2A-1D3B-7648-8949-4E28062C9D09}"/>
+              </a:ext>
+            </a:extLst>
+          </p:cNvPr>
+          <p:cNvSpPr/>
+          <p:nvPr/>
+        </p:nvSpPr>
+        <p:spPr>
+          <a:xfrm>
+            <a:off x="7748001" y="3875838"/>
+            <a:ext cx="1566673" cy="629107"/>
+          </a:xfrm>
+          <a:prstGeom prst="rect">
+            <a:avLst/>
+          </a:prstGeom>
+          <a:noFill/>
+          <a:ln>
+            <a:solidFill>
+              <a:schemeClr val="tx1"/>
+            </a:solidFill>
+          </a:ln>
+        </p:spPr>
+        <p:style>
+          <a:lnRef idx="2">
+            <a:schemeClr val="accent1">
+              <a:shade val="50000"/>
+            </a:schemeClr>
+          </a:lnRef>
+          <a:fillRef idx="1">
+            <a:schemeClr val="accent1"/>
+          </a:fillRef>
+          <a:effectRef idx="0">
+            <a:schemeClr val="accent1"/>
+          </a:effectRef>
+          <a:fontRef idx="minor">
+            <a:schemeClr val="lt1"/>
+          </a:fontRef>
+        </p:style>
+        <p:txBody>
+          <a:bodyPr rtlCol="0" anchor="ctr"/>
+          <a:lstStyle/>
+          <a:p>
+            <a:pPr algn="ctr"/>
+            <a:endParaRPr lang="en-US"/>
+          </a:p>
+        </p:txBody>
+      </p:sp>
+      <p:sp>
+        <p:nvSpPr>
+          <p:cNvPr id="24" name="TextBox 23">
+            <a:extLst>
+              <a:ext uri="{FF2B5EF4-FFF2-40B4-BE49-F238E27FC236}">
+                <a16:creationId xmlns:a16="http://schemas.microsoft.com/office/drawing/2014/main" id="{BBE9071F-F1DE-2B40-8531-87DD211B80FE}"/>
+              </a:ext>
+            </a:extLst>
+          </p:cNvPr>
+          <p:cNvSpPr txBox="1"/>
+          <p:nvPr/>
+        </p:nvSpPr>
+        <p:spPr>
+          <a:xfrm>
+            <a:off x="8096762" y="4005725"/>
+            <a:ext cx="869149" cy="369332"/>
+          </a:xfrm>
+          <a:prstGeom prst="rect">
+            <a:avLst/>
+          </a:prstGeom>
+          <a:noFill/>
+        </p:spPr>
+        <p:txBody>
+          <a:bodyPr wrap="none" rtlCol="0">
+            <a:spAutoFit/>
+          </a:bodyPr>
+          <a:lstStyle/>
+          <a:p>
+            <a:r>
+              <a:rPr lang="en-US" dirty="0"/>
+              <a:t>A place</a:t>
+            </a:r>
+          </a:p>
+        </p:txBody>
+      </p:sp>
+      <p:cxnSp>
+        <p:nvCxnSpPr>
+          <p:cNvPr id="26" name="Straight Arrow Connector 25">
+            <a:extLst>
+              <a:ext uri="{FF2B5EF4-FFF2-40B4-BE49-F238E27FC236}">
+                <a16:creationId xmlns:a16="http://schemas.microsoft.com/office/drawing/2014/main" id="{6DE0C126-CBBB-D34D-8B82-2168CDA8E92E}"/>
+              </a:ext>
+            </a:extLst>
+          </p:cNvPr>
+          <p:cNvCxnSpPr/>
+          <p:nvPr/>
+        </p:nvCxnSpPr>
+        <p:spPr>
+          <a:xfrm flipV="1">
+            <a:off x="5772904" y="1815120"/>
+            <a:ext cx="0" cy="2064485"/>
+          </a:xfrm>
+          <a:prstGeom prst="straightConnector1">
+            <a:avLst/>
+          </a:prstGeom>
+          <a:ln w="19050">
+            <a:solidFill>
+              <a:schemeClr val="accent6">
+                <a:lumMod val="75000"/>
+              </a:schemeClr>
+            </a:solidFill>
+            <a:tailEnd type="triangle"/>
+          </a:ln>
+        </p:spPr>
+        <p:style>
+          <a:lnRef idx="1">
+            <a:schemeClr val="accent1"/>
+          </a:lnRef>
+          <a:fillRef idx="0">
+            <a:schemeClr val="accent1"/>
+          </a:fillRef>
+          <a:effectRef idx="0">
+            <a:schemeClr val="accent1"/>
+          </a:effectRef>
+          <a:fontRef idx="minor">
+            <a:schemeClr val="tx1"/>
+          </a:fontRef>
+        </p:style>
+      </p:cxnSp>
+      <p:cxnSp>
+        <p:nvCxnSpPr>
+          <p:cNvPr id="27" name="Straight Arrow Connector 26">
+            <a:extLst>
+              <a:ext uri="{FF2B5EF4-FFF2-40B4-BE49-F238E27FC236}">
+                <a16:creationId xmlns:a16="http://schemas.microsoft.com/office/drawing/2014/main" id="{FF8330FB-E014-B845-B6A3-D69707AAE81A}"/>
+              </a:ext>
+            </a:extLst>
+          </p:cNvPr>
+          <p:cNvCxnSpPr>
+            <a:cxnSpLocks/>
+          </p:cNvCxnSpPr>
+          <p:nvPr/>
+        </p:nvCxnSpPr>
+        <p:spPr>
+          <a:xfrm flipH="1" flipV="1">
+            <a:off x="6313018" y="1815120"/>
+            <a:ext cx="2218318" cy="2064486"/>
+          </a:xfrm>
+          <a:prstGeom prst="straightConnector1">
+            <a:avLst/>
+          </a:prstGeom>
+          <a:ln w="19050">
+            <a:solidFill>
+              <a:schemeClr val="accent6">
+                <a:lumMod val="75000"/>
+              </a:schemeClr>
+            </a:solidFill>
+            <a:tailEnd type="triangle"/>
+          </a:ln>
+        </p:spPr>
+        <p:style>
+          <a:lnRef idx="1">
+            <a:schemeClr val="accent1"/>
+          </a:lnRef>
+          <a:fillRef idx="0">
+            <a:schemeClr val="accent1"/>
+          </a:fillRef>
+          <a:effectRef idx="0">
+            <a:schemeClr val="accent1"/>
+          </a:effectRef>
+          <a:fontRef idx="minor">
+            <a:schemeClr val="tx1"/>
+          </a:fontRef>
+        </p:style>
+      </p:cxnSp>
+      <p:sp>
+        <p:nvSpPr>
+          <p:cNvPr id="29" name="Rectangle 28">
+            <a:extLst>
+              <a:ext uri="{FF2B5EF4-FFF2-40B4-BE49-F238E27FC236}">
+                <a16:creationId xmlns:a16="http://schemas.microsoft.com/office/drawing/2014/main" id="{DD20E9B9-E7CF-BC49-AF28-F1D98A31B9B8}"/>
+              </a:ext>
+            </a:extLst>
+          </p:cNvPr>
+          <p:cNvSpPr/>
+          <p:nvPr/>
+        </p:nvSpPr>
+        <p:spPr>
+          <a:xfrm>
+            <a:off x="5006220" y="5441104"/>
+            <a:ext cx="1566673" cy="629107"/>
+          </a:xfrm>
+          <a:prstGeom prst="rect">
+            <a:avLst/>
+          </a:prstGeom>
+          <a:noFill/>
+          <a:ln>
+            <a:solidFill>
+              <a:schemeClr val="tx1"/>
+            </a:solidFill>
+          </a:ln>
+        </p:spPr>
+        <p:style>
+          <a:lnRef idx="2">
+            <a:schemeClr val="accent1">
+              <a:shade val="50000"/>
+            </a:schemeClr>
+          </a:lnRef>
+          <a:fillRef idx="1">
+            <a:schemeClr val="accent1"/>
+          </a:fillRef>
+          <a:effectRef idx="0">
+            <a:schemeClr val="accent1"/>
+          </a:effectRef>
+          <a:fontRef idx="minor">
+            <a:schemeClr val="lt1"/>
+          </a:fontRef>
+        </p:style>
+        <p:txBody>
+          <a:bodyPr rtlCol="0" anchor="ctr"/>
+          <a:lstStyle/>
+          <a:p>
+            <a:pPr algn="ctr"/>
+            <a:endParaRPr lang="en-US"/>
+          </a:p>
+        </p:txBody>
+      </p:sp>
+      <p:sp>
+        <p:nvSpPr>
+          <p:cNvPr id="30" name="TextBox 29">
+            <a:extLst>
+              <a:ext uri="{FF2B5EF4-FFF2-40B4-BE49-F238E27FC236}">
+                <a16:creationId xmlns:a16="http://schemas.microsoft.com/office/drawing/2014/main" id="{9552BF33-F207-B049-82D7-93562FCB0A64}"/>
+              </a:ext>
+            </a:extLst>
+          </p:cNvPr>
+          <p:cNvSpPr txBox="1"/>
+          <p:nvPr/>
+        </p:nvSpPr>
+        <p:spPr>
+          <a:xfrm>
+            <a:off x="5354981" y="5570991"/>
+            <a:ext cx="976549" cy="369332"/>
+          </a:xfrm>
+          <a:prstGeom prst="rect">
+            <a:avLst/>
+          </a:prstGeom>
+          <a:noFill/>
+        </p:spPr>
+        <p:txBody>
+          <a:bodyPr wrap="none" rtlCol="0">
+            <a:spAutoFit/>
+          </a:bodyPr>
+          <a:lstStyle/>
+          <a:p>
+            <a:r>
+              <a:rPr lang="en-US" dirty="0"/>
+              <a:t>Map API</a:t>
+            </a:r>
+          </a:p>
+        </p:txBody>
+      </p:sp>
+      <p:cxnSp>
+        <p:nvCxnSpPr>
+          <p:cNvPr id="31" name="Straight Arrow Connector 30">
+            <a:extLst>
+              <a:ext uri="{FF2B5EF4-FFF2-40B4-BE49-F238E27FC236}">
+                <a16:creationId xmlns:a16="http://schemas.microsoft.com/office/drawing/2014/main" id="{7D64D720-7C60-EF41-A32A-21E44AF3F237}"/>
+              </a:ext>
+            </a:extLst>
+          </p:cNvPr>
+          <p:cNvCxnSpPr>
+            <a:cxnSpLocks/>
+            <a:stCxn id="14" idx="2"/>
+          </p:cNvCxnSpPr>
+          <p:nvPr/>
+        </p:nvCxnSpPr>
+        <p:spPr>
+          <a:xfrm>
+            <a:off x="2914945" y="4504945"/>
+            <a:ext cx="2091275" cy="936160"/>
+          </a:xfrm>
+          <a:prstGeom prst="straightConnector1">
+            <a:avLst/>
+          </a:prstGeom>
+          <a:ln w="19050">
+            <a:solidFill>
+              <a:schemeClr val="accent6">
+                <a:lumMod val="75000"/>
+              </a:schemeClr>
+            </a:solidFill>
+            <a:tailEnd type="triangle"/>
+          </a:ln>
+        </p:spPr>
+        <p:style>
+          <a:lnRef idx="1">
+            <a:schemeClr val="accent1"/>
+          </a:lnRef>
+          <a:fillRef idx="0">
+            <a:schemeClr val="accent1"/>
+          </a:fillRef>
+          <a:effectRef idx="0">
+            <a:schemeClr val="accent1"/>
+          </a:effectRef>
+          <a:fontRef idx="minor">
+            <a:schemeClr val="tx1"/>
+          </a:fontRef>
+        </p:style>
+      </p:cxnSp>
+      <p:cxnSp>
+        <p:nvCxnSpPr>
+          <p:cNvPr id="34" name="Straight Arrow Connector 33">
+            <a:extLst>
+              <a:ext uri="{FF2B5EF4-FFF2-40B4-BE49-F238E27FC236}">
+                <a16:creationId xmlns:a16="http://schemas.microsoft.com/office/drawing/2014/main" id="{81463572-4505-5043-9A40-9108B7A78BA9}"/>
+              </a:ext>
+            </a:extLst>
+          </p:cNvPr>
+          <p:cNvCxnSpPr>
+            <a:cxnSpLocks/>
+            <a:endCxn id="23" idx="2"/>
+          </p:cNvCxnSpPr>
+          <p:nvPr/>
+        </p:nvCxnSpPr>
+        <p:spPr>
+          <a:xfrm flipV="1">
+            <a:off x="6539588" y="4504945"/>
+            <a:ext cx="1991750" cy="936158"/>
+          </a:xfrm>
+          <a:prstGeom prst="straightConnector1">
+            <a:avLst/>
+          </a:prstGeom>
+          <a:ln w="19050">
+            <a:solidFill>
+              <a:schemeClr val="accent2">
+                <a:lumMod val="75000"/>
+              </a:schemeClr>
+            </a:solidFill>
+            <a:headEnd type="none" w="med" len="med"/>
+            <a:tailEnd type="triangle" w="med" len="med"/>
+          </a:ln>
+        </p:spPr>
+        <p:style>
+          <a:lnRef idx="1">
+            <a:schemeClr val="accent1"/>
+          </a:lnRef>
+          <a:fillRef idx="0">
+            <a:schemeClr val="accent1"/>
+          </a:fillRef>
+          <a:effectRef idx="0">
+            <a:schemeClr val="accent1"/>
+          </a:effectRef>
+          <a:fontRef idx="minor">
+            <a:schemeClr val="tx1"/>
+          </a:fontRef>
+        </p:style>
+      </p:cxnSp>
+      <p:cxnSp>
+        <p:nvCxnSpPr>
+          <p:cNvPr id="36" name="Straight Arrow Connector 35">
+            <a:extLst>
+              <a:ext uri="{FF2B5EF4-FFF2-40B4-BE49-F238E27FC236}">
+                <a16:creationId xmlns:a16="http://schemas.microsoft.com/office/drawing/2014/main" id="{845EF6EA-FB6D-C945-87EB-C2F4E7804D22}"/>
+              </a:ext>
+            </a:extLst>
+          </p:cNvPr>
+          <p:cNvCxnSpPr>
+            <a:cxnSpLocks/>
+            <a:endCxn id="22" idx="2"/>
+          </p:cNvCxnSpPr>
+          <p:nvPr/>
+        </p:nvCxnSpPr>
+        <p:spPr>
+          <a:xfrm flipH="1" flipV="1">
+            <a:off x="5772904" y="4557466"/>
+            <a:ext cx="13466" cy="883638"/>
+          </a:xfrm>
+          <a:prstGeom prst="straightConnector1">
+            <a:avLst/>
+          </a:prstGeom>
+          <a:ln w="19050">
+            <a:solidFill>
+              <a:schemeClr val="accent2">
+                <a:lumMod val="75000"/>
+              </a:schemeClr>
+            </a:solidFill>
+            <a:headEnd type="none" w="med" len="med"/>
+            <a:tailEnd type="triangle" w="med" len="med"/>
+          </a:ln>
+        </p:spPr>
+        <p:style>
+          <a:lnRef idx="1">
+            <a:schemeClr val="accent1"/>
+          </a:lnRef>
+          <a:fillRef idx="0">
+            <a:schemeClr val="accent1"/>
+          </a:fillRef>
+          <a:effectRef idx="0">
+            <a:schemeClr val="accent1"/>
+          </a:effectRef>
+          <a:fontRef idx="minor">
+            <a:schemeClr val="tx1"/>
+          </a:fontRef>
+        </p:style>
+      </p:cxnSp>
     </p:spTree>
     <p:extLst>
       <p:ext uri="{BB962C8B-B14F-4D97-AF65-F5344CB8AC3E}">
@@ -7522,6 +8336,96 @@
               <a:rPr lang="en-US" sz="2400" dirty="0"/>
               <a:t>6. Class Diagram</a:t>
             </a:r>
+          </a:p>
+        </p:txBody>
+      </p:sp>
+      <p:sp>
+        <p:nvSpPr>
+          <p:cNvPr id="28" name="Rectangle 27">
+            <a:extLst>
+              <a:ext uri="{FF2B5EF4-FFF2-40B4-BE49-F238E27FC236}">
+                <a16:creationId xmlns:a16="http://schemas.microsoft.com/office/drawing/2014/main" id="{2CA700B7-7B3E-FB47-A846-2202300AEF59}"/>
+              </a:ext>
+            </a:extLst>
+          </p:cNvPr>
+          <p:cNvSpPr/>
+          <p:nvPr/>
+        </p:nvSpPr>
+        <p:spPr>
+          <a:xfrm>
+            <a:off x="1439917" y="1166648"/>
+            <a:ext cx="2690649" cy="3121573"/>
+          </a:xfrm>
+          <a:prstGeom prst="rect">
+            <a:avLst/>
+          </a:prstGeom>
+          <a:noFill/>
+          <a:ln>
+            <a:solidFill>
+              <a:schemeClr val="bg1">
+                <a:lumMod val="50000"/>
+              </a:schemeClr>
+            </a:solidFill>
+          </a:ln>
+        </p:spPr>
+        <p:style>
+          <a:lnRef idx="2">
+            <a:schemeClr val="accent1">
+              <a:shade val="50000"/>
+            </a:schemeClr>
+          </a:lnRef>
+          <a:fillRef idx="1">
+            <a:schemeClr val="accent1"/>
+          </a:fillRef>
+          <a:effectRef idx="0">
+            <a:schemeClr val="accent1"/>
+          </a:effectRef>
+          <a:fontRef idx="minor">
+            <a:schemeClr val="lt1"/>
+          </a:fontRef>
+        </p:style>
+        <p:txBody>
+          <a:bodyPr rtlCol="0" anchor="ctr"/>
+          <a:lstStyle/>
+          <a:p>
+            <a:pPr algn="ctr"/>
+            <a:endParaRPr lang="en-US"/>
+          </a:p>
+        </p:txBody>
+      </p:sp>
+      <p:sp>
+        <p:nvSpPr>
+          <p:cNvPr id="29" name="TextBox 28">
+            <a:extLst>
+              <a:ext uri="{FF2B5EF4-FFF2-40B4-BE49-F238E27FC236}">
+                <a16:creationId xmlns:a16="http://schemas.microsoft.com/office/drawing/2014/main" id="{F653690C-A73A-774F-8B90-5EC6639ED7F1}"/>
+              </a:ext>
+            </a:extLst>
+          </p:cNvPr>
+          <p:cNvSpPr txBox="1"/>
+          <p:nvPr/>
+        </p:nvSpPr>
+        <p:spPr>
+          <a:xfrm>
+            <a:off x="1539579" y="1303283"/>
+            <a:ext cx="1245662" cy="369332"/>
+          </a:xfrm>
+          <a:prstGeom prst="rect">
+            <a:avLst/>
+          </a:prstGeom>
+          <a:noFill/>
+        </p:spPr>
+        <p:txBody>
+          <a:bodyPr wrap="none" rtlCol="0">
+            <a:spAutoFit/>
+          </a:bodyPr>
+          <a:lstStyle/>
+          <a:p>
+            <a:r>
+              <a:rPr lang="en-US" dirty="0" err="1"/>
+              <a:t>SearchUser</a:t>
+            </a:r>
+            <a:endParaRPr lang="en-US" dirty="0"/>
           </a:p>
         </p:txBody>
       </p:sp>

</xml_diff>

<commit_message>
add crc card part(#7)
</commit_message>
<xml_diff>
--- a/Milestone#2 Reportouts/UMLDiagrams.pptx
+++ b/Milestone#2 Reportouts/UMLDiagrams.pptx
@@ -11,6 +11,8 @@
     <p:sldId id="259" r:id="rId5"/>
     <p:sldId id="260" r:id="rId6"/>
     <p:sldId id="261" r:id="rId7"/>
+    <p:sldId id="262" r:id="rId8"/>
+    <p:sldId id="263" r:id="rId9"/>
   </p:sldIdLst>
   <p:sldSz cx="12192000" cy="6858000"/>
   <p:notesSz cx="6858000" cy="9144000"/>
@@ -8761,7 +8763,7 @@
         <p:spPr>
           <a:xfrm>
             <a:off x="4498355" y="1240223"/>
-            <a:ext cx="1602105" cy="369332"/>
+            <a:ext cx="1084592" cy="369332"/>
           </a:xfrm>
           <a:prstGeom prst="rect">
             <a:avLst/>
@@ -8776,7 +8778,7 @@
           <a:p>
             <a:r>
               <a:rPr lang="en-US" dirty="0" err="1"/>
-              <a:t>RestaurantsList</a:t>
+              <a:t>PlacesList</a:t>
             </a:r>
             <a:endParaRPr lang="en-US" dirty="0"/>
           </a:p>
@@ -9801,13 +9803,8 @@
             </a:r>
             <a:r>
               <a:rPr lang="en-US" sz="1200" dirty="0"/>
-              <a:t> of </a:t>
-            </a:r>
-            <a:r>
-              <a:rPr lang="en-US" sz="1200"/>
-              <a:t>the place */</a:t>
-            </a:r>
-            <a:endParaRPr lang="en-US" sz="1200" dirty="0"/>
+              <a:t> of the place */</a:t>
+            </a:r>
           </a:p>
         </p:txBody>
       </p:sp>
@@ -9815,6 +9812,1078 @@
     <p:extLst>
       <p:ext uri="{BB962C8B-B14F-4D97-AF65-F5344CB8AC3E}">
         <p14:creationId xmlns:p14="http://schemas.microsoft.com/office/powerpoint/2010/main" val="1666451953"/>
+      </p:ext>
+    </p:extLst>
+  </p:cSld>
+  <p:clrMapOvr>
+    <a:masterClrMapping/>
+  </p:clrMapOvr>
+</p:sld>
+</file>
+
+<file path=ppt/slides/slide7.xml><?xml version="1.0" encoding="utf-8"?>
+<p:sld xmlns:a="http://schemas.openxmlformats.org/drawingml/2006/main" xmlns:r="http://schemas.openxmlformats.org/officeDocument/2006/relationships" xmlns:p="http://schemas.openxmlformats.org/presentationml/2006/main">
+  <p:cSld>
+    <p:spTree>
+      <p:nvGrpSpPr>
+        <p:cNvPr id="1" name=""/>
+        <p:cNvGrpSpPr/>
+        <p:nvPr/>
+      </p:nvGrpSpPr>
+      <p:grpSpPr>
+        <a:xfrm>
+          <a:off x="0" y="0"/>
+          <a:ext cx="0" cy="0"/>
+          <a:chOff x="0" y="0"/>
+          <a:chExt cx="0" cy="0"/>
+        </a:xfrm>
+      </p:grpSpPr>
+      <p:sp>
+        <p:nvSpPr>
+          <p:cNvPr id="4" name="TextBox 3">
+            <a:extLst>
+              <a:ext uri="{FF2B5EF4-FFF2-40B4-BE49-F238E27FC236}">
+                <a16:creationId xmlns:a16="http://schemas.microsoft.com/office/drawing/2014/main" id="{08DDDC44-D9DC-9340-9F91-680E9271A33F}"/>
+              </a:ext>
+            </a:extLst>
+          </p:cNvPr>
+          <p:cNvSpPr txBox="1"/>
+          <p:nvPr/>
+        </p:nvSpPr>
+        <p:spPr>
+          <a:xfrm>
+            <a:off x="857182" y="512064"/>
+            <a:ext cx="1742272" cy="461665"/>
+          </a:xfrm>
+          <a:prstGeom prst="rect">
+            <a:avLst/>
+          </a:prstGeom>
+          <a:noFill/>
+        </p:spPr>
+        <p:txBody>
+          <a:bodyPr wrap="none" rtlCol="0">
+            <a:spAutoFit/>
+          </a:bodyPr>
+          <a:lstStyle/>
+          <a:p>
+            <a:r>
+              <a:rPr lang="en-US" sz="2400" dirty="0"/>
+              <a:t>7. CRC Cards</a:t>
+            </a:r>
+          </a:p>
+        </p:txBody>
+      </p:sp>
+      <p:sp>
+        <p:nvSpPr>
+          <p:cNvPr id="5" name="Rectangle 4">
+            <a:extLst>
+              <a:ext uri="{FF2B5EF4-FFF2-40B4-BE49-F238E27FC236}">
+                <a16:creationId xmlns:a16="http://schemas.microsoft.com/office/drawing/2014/main" id="{721DC5E8-27D2-314F-BDBD-0E7605FEB9A0}"/>
+              </a:ext>
+            </a:extLst>
+          </p:cNvPr>
+          <p:cNvSpPr/>
+          <p:nvPr/>
+        </p:nvSpPr>
+        <p:spPr>
+          <a:xfrm>
+            <a:off x="945930" y="1198178"/>
+            <a:ext cx="4866289" cy="3058511"/>
+          </a:xfrm>
+          <a:prstGeom prst="rect">
+            <a:avLst/>
+          </a:prstGeom>
+          <a:noFill/>
+          <a:ln w="19050">
+            <a:solidFill>
+              <a:schemeClr val="tx1"/>
+            </a:solidFill>
+          </a:ln>
+        </p:spPr>
+        <p:style>
+          <a:lnRef idx="2">
+            <a:schemeClr val="accent1">
+              <a:shade val="50000"/>
+            </a:schemeClr>
+          </a:lnRef>
+          <a:fillRef idx="1">
+            <a:schemeClr val="accent1"/>
+          </a:fillRef>
+          <a:effectRef idx="0">
+            <a:schemeClr val="accent1"/>
+          </a:effectRef>
+          <a:fontRef idx="minor">
+            <a:schemeClr val="lt1"/>
+          </a:fontRef>
+        </p:style>
+        <p:txBody>
+          <a:bodyPr rtlCol="0" anchor="ctr"/>
+          <a:lstStyle/>
+          <a:p>
+            <a:pPr algn="ctr"/>
+            <a:endParaRPr lang="en-US"/>
+          </a:p>
+        </p:txBody>
+      </p:sp>
+      <p:sp>
+        <p:nvSpPr>
+          <p:cNvPr id="6" name="TextBox 5">
+            <a:extLst>
+              <a:ext uri="{FF2B5EF4-FFF2-40B4-BE49-F238E27FC236}">
+                <a16:creationId xmlns:a16="http://schemas.microsoft.com/office/drawing/2014/main" id="{C08C3D38-A751-A247-96ED-F83B55C072B8}"/>
+              </a:ext>
+            </a:extLst>
+          </p:cNvPr>
+          <p:cNvSpPr txBox="1"/>
+          <p:nvPr/>
+        </p:nvSpPr>
+        <p:spPr>
+          <a:xfrm>
+            <a:off x="1051034" y="1366344"/>
+            <a:ext cx="1663212" cy="369332"/>
+          </a:xfrm>
+          <a:prstGeom prst="rect">
+            <a:avLst/>
+          </a:prstGeom>
+          <a:noFill/>
+        </p:spPr>
+        <p:txBody>
+          <a:bodyPr wrap="none" rtlCol="0">
+            <a:spAutoFit/>
+          </a:bodyPr>
+          <a:lstStyle/>
+          <a:p>
+            <a:r>
+              <a:rPr lang="en-US" dirty="0"/>
+              <a:t>Search Location</a:t>
+            </a:r>
+          </a:p>
+        </p:txBody>
+      </p:sp>
+      <p:sp>
+        <p:nvSpPr>
+          <p:cNvPr id="7" name="TextBox 6">
+            <a:extLst>
+              <a:ext uri="{FF2B5EF4-FFF2-40B4-BE49-F238E27FC236}">
+                <a16:creationId xmlns:a16="http://schemas.microsoft.com/office/drawing/2014/main" id="{3196D4A7-7C15-4946-958D-5258BB30E577}"/>
+              </a:ext>
+            </a:extLst>
+          </p:cNvPr>
+          <p:cNvSpPr txBox="1"/>
+          <p:nvPr/>
+        </p:nvSpPr>
+        <p:spPr>
+          <a:xfrm>
+            <a:off x="1160759" y="1990984"/>
+            <a:ext cx="2643985" cy="954107"/>
+          </a:xfrm>
+          <a:prstGeom prst="rect">
+            <a:avLst/>
+          </a:prstGeom>
+          <a:noFill/>
+        </p:spPr>
+        <p:txBody>
+          <a:bodyPr wrap="square" rtlCol="0">
+            <a:spAutoFit/>
+          </a:bodyPr>
+          <a:lstStyle/>
+          <a:p>
+            <a:r>
+              <a:rPr lang="en-US" sz="1400" dirty="0"/>
+              <a:t>To get geological data automatically by using </a:t>
+            </a:r>
+            <a:r>
+              <a:rPr lang="en-US" sz="1400" dirty="0" err="1"/>
+              <a:t>javascript</a:t>
+            </a:r>
+            <a:r>
+              <a:rPr lang="en-US" sz="1400" dirty="0"/>
+              <a:t> function (e.g. longitude and latitude)</a:t>
+            </a:r>
+          </a:p>
+        </p:txBody>
+      </p:sp>
+      <p:sp>
+        <p:nvSpPr>
+          <p:cNvPr id="8" name="TextBox 7">
+            <a:extLst>
+              <a:ext uri="{FF2B5EF4-FFF2-40B4-BE49-F238E27FC236}">
+                <a16:creationId xmlns:a16="http://schemas.microsoft.com/office/drawing/2014/main" id="{0D84A485-9253-AB48-B622-65240D3AED8A}"/>
+              </a:ext>
+            </a:extLst>
+          </p:cNvPr>
+          <p:cNvSpPr txBox="1"/>
+          <p:nvPr/>
+        </p:nvSpPr>
+        <p:spPr>
+          <a:xfrm>
+            <a:off x="1160759" y="3200399"/>
+            <a:ext cx="2643985" cy="738664"/>
+          </a:xfrm>
+          <a:prstGeom prst="rect">
+            <a:avLst/>
+          </a:prstGeom>
+          <a:noFill/>
+        </p:spPr>
+        <p:txBody>
+          <a:bodyPr wrap="square" rtlCol="0">
+            <a:spAutoFit/>
+          </a:bodyPr>
+          <a:lstStyle/>
+          <a:p>
+            <a:r>
+              <a:rPr lang="en-US" sz="1400" dirty="0"/>
+              <a:t>If the browser does not allow this functionally, users have to type in city or street name manually</a:t>
+            </a:r>
+          </a:p>
+        </p:txBody>
+      </p:sp>
+      <p:cxnSp>
+        <p:nvCxnSpPr>
+          <p:cNvPr id="10" name="Straight Connector 9">
+            <a:extLst>
+              <a:ext uri="{FF2B5EF4-FFF2-40B4-BE49-F238E27FC236}">
+                <a16:creationId xmlns:a16="http://schemas.microsoft.com/office/drawing/2014/main" id="{35658AAC-D283-0D4E-A670-01E7779E0636}"/>
+              </a:ext>
+            </a:extLst>
+          </p:cNvPr>
+          <p:cNvCxnSpPr/>
+          <p:nvPr/>
+        </p:nvCxnSpPr>
+        <p:spPr>
+          <a:xfrm>
+            <a:off x="3972910" y="1990984"/>
+            <a:ext cx="0" cy="1948079"/>
+          </a:xfrm>
+          <a:prstGeom prst="line">
+            <a:avLst/>
+          </a:prstGeom>
+          <a:ln w="12700">
+            <a:solidFill>
+              <a:schemeClr val="bg1">
+                <a:lumMod val="50000"/>
+              </a:schemeClr>
+            </a:solidFill>
+          </a:ln>
+        </p:spPr>
+        <p:style>
+          <a:lnRef idx="1">
+            <a:schemeClr val="accent1"/>
+          </a:lnRef>
+          <a:fillRef idx="0">
+            <a:schemeClr val="accent1"/>
+          </a:fillRef>
+          <a:effectRef idx="0">
+            <a:schemeClr val="accent1"/>
+          </a:effectRef>
+          <a:fontRef idx="minor">
+            <a:schemeClr val="tx1"/>
+          </a:fontRef>
+        </p:style>
+      </p:cxnSp>
+      <p:sp>
+        <p:nvSpPr>
+          <p:cNvPr id="11" name="Rectangle 10">
+            <a:extLst>
+              <a:ext uri="{FF2B5EF4-FFF2-40B4-BE49-F238E27FC236}">
+                <a16:creationId xmlns:a16="http://schemas.microsoft.com/office/drawing/2014/main" id="{B3C35FD5-27D5-F048-95C5-703D230749F7}"/>
+              </a:ext>
+            </a:extLst>
+          </p:cNvPr>
+          <p:cNvSpPr/>
+          <p:nvPr/>
+        </p:nvSpPr>
+        <p:spPr>
+          <a:xfrm>
+            <a:off x="6321971" y="1198178"/>
+            <a:ext cx="4866289" cy="3058511"/>
+          </a:xfrm>
+          <a:prstGeom prst="rect">
+            <a:avLst/>
+          </a:prstGeom>
+          <a:noFill/>
+          <a:ln w="19050">
+            <a:solidFill>
+              <a:schemeClr val="tx1"/>
+            </a:solidFill>
+          </a:ln>
+        </p:spPr>
+        <p:style>
+          <a:lnRef idx="2">
+            <a:schemeClr val="accent1">
+              <a:shade val="50000"/>
+            </a:schemeClr>
+          </a:lnRef>
+          <a:fillRef idx="1">
+            <a:schemeClr val="accent1"/>
+          </a:fillRef>
+          <a:effectRef idx="0">
+            <a:schemeClr val="accent1"/>
+          </a:effectRef>
+          <a:fontRef idx="minor">
+            <a:schemeClr val="lt1"/>
+          </a:fontRef>
+        </p:style>
+        <p:txBody>
+          <a:bodyPr rtlCol="0" anchor="ctr"/>
+          <a:lstStyle/>
+          <a:p>
+            <a:pPr algn="ctr"/>
+            <a:endParaRPr lang="en-US"/>
+          </a:p>
+        </p:txBody>
+      </p:sp>
+      <p:sp>
+        <p:nvSpPr>
+          <p:cNvPr id="12" name="TextBox 11">
+            <a:extLst>
+              <a:ext uri="{FF2B5EF4-FFF2-40B4-BE49-F238E27FC236}">
+                <a16:creationId xmlns:a16="http://schemas.microsoft.com/office/drawing/2014/main" id="{C0BCDD8E-4840-8049-996E-FB007A4AA83D}"/>
+              </a:ext>
+            </a:extLst>
+          </p:cNvPr>
+          <p:cNvSpPr txBox="1"/>
+          <p:nvPr/>
+        </p:nvSpPr>
+        <p:spPr>
+          <a:xfrm>
+            <a:off x="6427075" y="1366344"/>
+            <a:ext cx="1084592" cy="369332"/>
+          </a:xfrm>
+          <a:prstGeom prst="rect">
+            <a:avLst/>
+          </a:prstGeom>
+          <a:noFill/>
+        </p:spPr>
+        <p:txBody>
+          <a:bodyPr wrap="none" rtlCol="0">
+            <a:spAutoFit/>
+          </a:bodyPr>
+          <a:lstStyle/>
+          <a:p>
+            <a:r>
+              <a:rPr lang="en-US" dirty="0" err="1"/>
+              <a:t>PlacesList</a:t>
+            </a:r>
+            <a:endParaRPr lang="en-US" dirty="0"/>
+          </a:p>
+        </p:txBody>
+      </p:sp>
+      <p:sp>
+        <p:nvSpPr>
+          <p:cNvPr id="13" name="TextBox 12">
+            <a:extLst>
+              <a:ext uri="{FF2B5EF4-FFF2-40B4-BE49-F238E27FC236}">
+                <a16:creationId xmlns:a16="http://schemas.microsoft.com/office/drawing/2014/main" id="{651AAC21-CCF9-884F-A7F2-CD2B2220A18A}"/>
+              </a:ext>
+            </a:extLst>
+          </p:cNvPr>
+          <p:cNvSpPr txBox="1"/>
+          <p:nvPr/>
+        </p:nvSpPr>
+        <p:spPr>
+          <a:xfrm>
+            <a:off x="6536800" y="1990984"/>
+            <a:ext cx="2643985" cy="954107"/>
+          </a:xfrm>
+          <a:prstGeom prst="rect">
+            <a:avLst/>
+          </a:prstGeom>
+          <a:noFill/>
+        </p:spPr>
+        <p:txBody>
+          <a:bodyPr wrap="square" rtlCol="0">
+            <a:spAutoFit/>
+          </a:bodyPr>
+          <a:lstStyle/>
+          <a:p>
+            <a:r>
+              <a:rPr lang="en-US" sz="1400" dirty="0"/>
+              <a:t>List up Places list according to the search input(e.g. longitude and latitude, city name, and street name) </a:t>
+            </a:r>
+          </a:p>
+        </p:txBody>
+      </p:sp>
+      <p:sp>
+        <p:nvSpPr>
+          <p:cNvPr id="14" name="TextBox 13">
+            <a:extLst>
+              <a:ext uri="{FF2B5EF4-FFF2-40B4-BE49-F238E27FC236}">
+                <a16:creationId xmlns:a16="http://schemas.microsoft.com/office/drawing/2014/main" id="{B03B08D7-519D-2C47-9CDF-1F07CD16C990}"/>
+              </a:ext>
+            </a:extLst>
+          </p:cNvPr>
+          <p:cNvSpPr txBox="1"/>
+          <p:nvPr/>
+        </p:nvSpPr>
+        <p:spPr>
+          <a:xfrm>
+            <a:off x="6513469" y="2980788"/>
+            <a:ext cx="2643985" cy="523220"/>
+          </a:xfrm>
+          <a:prstGeom prst="rect">
+            <a:avLst/>
+          </a:prstGeom>
+          <a:noFill/>
+        </p:spPr>
+        <p:txBody>
+          <a:bodyPr wrap="square" rtlCol="0">
+            <a:spAutoFit/>
+          </a:bodyPr>
+          <a:lstStyle/>
+          <a:p>
+            <a:r>
+              <a:rPr lang="en-US" sz="1400" dirty="0"/>
+              <a:t>The places limited as a nearby restaurant</a:t>
+            </a:r>
+          </a:p>
+        </p:txBody>
+      </p:sp>
+      <p:cxnSp>
+        <p:nvCxnSpPr>
+          <p:cNvPr id="15" name="Straight Connector 14">
+            <a:extLst>
+              <a:ext uri="{FF2B5EF4-FFF2-40B4-BE49-F238E27FC236}">
+                <a16:creationId xmlns:a16="http://schemas.microsoft.com/office/drawing/2014/main" id="{4D08A771-AD36-614A-804E-00F4D2839292}"/>
+              </a:ext>
+            </a:extLst>
+          </p:cNvPr>
+          <p:cNvCxnSpPr/>
+          <p:nvPr/>
+        </p:nvCxnSpPr>
+        <p:spPr>
+          <a:xfrm>
+            <a:off x="9348951" y="1990984"/>
+            <a:ext cx="0" cy="1948079"/>
+          </a:xfrm>
+          <a:prstGeom prst="line">
+            <a:avLst/>
+          </a:prstGeom>
+          <a:ln w="12700">
+            <a:solidFill>
+              <a:schemeClr val="bg1">
+                <a:lumMod val="50000"/>
+              </a:schemeClr>
+            </a:solidFill>
+          </a:ln>
+        </p:spPr>
+        <p:style>
+          <a:lnRef idx="1">
+            <a:schemeClr val="accent1"/>
+          </a:lnRef>
+          <a:fillRef idx="0">
+            <a:schemeClr val="accent1"/>
+          </a:fillRef>
+          <a:effectRef idx="0">
+            <a:schemeClr val="accent1"/>
+          </a:effectRef>
+          <a:fontRef idx="minor">
+            <a:schemeClr val="tx1"/>
+          </a:fontRef>
+        </p:style>
+      </p:cxnSp>
+      <p:sp>
+        <p:nvSpPr>
+          <p:cNvPr id="16" name="TextBox 15">
+            <a:extLst>
+              <a:ext uri="{FF2B5EF4-FFF2-40B4-BE49-F238E27FC236}">
+                <a16:creationId xmlns:a16="http://schemas.microsoft.com/office/drawing/2014/main" id="{51FE01F5-7F8B-2940-B0C9-206494B9DE36}"/>
+              </a:ext>
+            </a:extLst>
+          </p:cNvPr>
+          <p:cNvSpPr txBox="1"/>
+          <p:nvPr/>
+        </p:nvSpPr>
+        <p:spPr>
+          <a:xfrm>
+            <a:off x="4311069" y="1990984"/>
+            <a:ext cx="994824" cy="369332"/>
+          </a:xfrm>
+          <a:prstGeom prst="rect">
+            <a:avLst/>
+          </a:prstGeom>
+          <a:noFill/>
+        </p:spPr>
+        <p:txBody>
+          <a:bodyPr wrap="none" rtlCol="0">
+            <a:spAutoFit/>
+          </a:bodyPr>
+          <a:lstStyle/>
+          <a:p>
+            <a:r>
+              <a:rPr lang="en-US" dirty="0" err="1"/>
+              <a:t>PlaceList</a:t>
+            </a:r>
+            <a:endParaRPr lang="en-US" dirty="0"/>
+          </a:p>
+        </p:txBody>
+      </p:sp>
+      <p:sp>
+        <p:nvSpPr>
+          <p:cNvPr id="22" name="TextBox 21">
+            <a:extLst>
+              <a:ext uri="{FF2B5EF4-FFF2-40B4-BE49-F238E27FC236}">
+                <a16:creationId xmlns:a16="http://schemas.microsoft.com/office/drawing/2014/main" id="{4D348E6D-511C-ED4D-B473-DB4F92DD5F04}"/>
+              </a:ext>
+            </a:extLst>
+          </p:cNvPr>
+          <p:cNvSpPr txBox="1"/>
+          <p:nvPr/>
+        </p:nvSpPr>
+        <p:spPr>
+          <a:xfrm>
+            <a:off x="6536800" y="3532947"/>
+            <a:ext cx="2643985" cy="738664"/>
+          </a:xfrm>
+          <a:prstGeom prst="rect">
+            <a:avLst/>
+          </a:prstGeom>
+          <a:noFill/>
+        </p:spPr>
+        <p:txBody>
+          <a:bodyPr wrap="square" rtlCol="0">
+            <a:spAutoFit/>
+          </a:bodyPr>
+          <a:lstStyle/>
+          <a:p>
+            <a:r>
+              <a:rPr lang="en-US" sz="1400" dirty="0"/>
+              <a:t>Filter can be applied </a:t>
+            </a:r>
+            <a:br>
+              <a:rPr lang="en-US" sz="1400" dirty="0"/>
+            </a:br>
+            <a:r>
+              <a:rPr lang="en-US" sz="1400" dirty="0"/>
+              <a:t>(e.g. how many item to list up, categories, </a:t>
+            </a:r>
+            <a:r>
+              <a:rPr lang="en-US" sz="1400" dirty="0" err="1"/>
+              <a:t>ditances</a:t>
+            </a:r>
+            <a:r>
+              <a:rPr lang="en-US" sz="1400" dirty="0"/>
+              <a:t>, etc.</a:t>
+            </a:r>
+          </a:p>
+        </p:txBody>
+      </p:sp>
+      <p:sp>
+        <p:nvSpPr>
+          <p:cNvPr id="23" name="TextBox 22">
+            <a:extLst>
+              <a:ext uri="{FF2B5EF4-FFF2-40B4-BE49-F238E27FC236}">
+                <a16:creationId xmlns:a16="http://schemas.microsoft.com/office/drawing/2014/main" id="{1F21A65A-2FE9-544B-9E02-678CBE1BBA9F}"/>
+              </a:ext>
+            </a:extLst>
+          </p:cNvPr>
+          <p:cNvSpPr txBox="1"/>
+          <p:nvPr/>
+        </p:nvSpPr>
+        <p:spPr>
+          <a:xfrm>
+            <a:off x="9690537" y="1990984"/>
+            <a:ext cx="1227387" cy="369332"/>
+          </a:xfrm>
+          <a:prstGeom prst="rect">
+            <a:avLst/>
+          </a:prstGeom>
+          <a:noFill/>
+        </p:spPr>
+        <p:txBody>
+          <a:bodyPr wrap="none" rtlCol="0">
+            <a:spAutoFit/>
+          </a:bodyPr>
+          <a:lstStyle/>
+          <a:p>
+            <a:r>
+              <a:rPr lang="en-US" dirty="0" err="1"/>
+              <a:t>PlaceDetail</a:t>
+            </a:r>
+            <a:endParaRPr lang="en-US" dirty="0"/>
+          </a:p>
+        </p:txBody>
+      </p:sp>
+    </p:spTree>
+    <p:extLst>
+      <p:ext uri="{BB962C8B-B14F-4D97-AF65-F5344CB8AC3E}">
+        <p14:creationId xmlns:p14="http://schemas.microsoft.com/office/powerpoint/2010/main" val="1927947186"/>
+      </p:ext>
+    </p:extLst>
+  </p:cSld>
+  <p:clrMapOvr>
+    <a:masterClrMapping/>
+  </p:clrMapOvr>
+</p:sld>
+</file>
+
+<file path=ppt/slides/slide8.xml><?xml version="1.0" encoding="utf-8"?>
+<p:sld xmlns:a="http://schemas.openxmlformats.org/drawingml/2006/main" xmlns:r="http://schemas.openxmlformats.org/officeDocument/2006/relationships" xmlns:p="http://schemas.openxmlformats.org/presentationml/2006/main">
+  <p:cSld>
+    <p:spTree>
+      <p:nvGrpSpPr>
+        <p:cNvPr id="1" name=""/>
+        <p:cNvGrpSpPr/>
+        <p:nvPr/>
+      </p:nvGrpSpPr>
+      <p:grpSpPr>
+        <a:xfrm>
+          <a:off x="0" y="0"/>
+          <a:ext cx="0" cy="0"/>
+          <a:chOff x="0" y="0"/>
+          <a:chExt cx="0" cy="0"/>
+        </a:xfrm>
+      </p:grpSpPr>
+      <p:sp>
+        <p:nvSpPr>
+          <p:cNvPr id="4" name="TextBox 3">
+            <a:extLst>
+              <a:ext uri="{FF2B5EF4-FFF2-40B4-BE49-F238E27FC236}">
+                <a16:creationId xmlns:a16="http://schemas.microsoft.com/office/drawing/2014/main" id="{B1A568CF-8305-1145-9559-B50CDB6596C0}"/>
+              </a:ext>
+            </a:extLst>
+          </p:cNvPr>
+          <p:cNvSpPr txBox="1"/>
+          <p:nvPr/>
+        </p:nvSpPr>
+        <p:spPr>
+          <a:xfrm>
+            <a:off x="857182" y="491044"/>
+            <a:ext cx="1742272" cy="461665"/>
+          </a:xfrm>
+          <a:prstGeom prst="rect">
+            <a:avLst/>
+          </a:prstGeom>
+          <a:noFill/>
+        </p:spPr>
+        <p:txBody>
+          <a:bodyPr wrap="none" rtlCol="0">
+            <a:spAutoFit/>
+          </a:bodyPr>
+          <a:lstStyle/>
+          <a:p>
+            <a:r>
+              <a:rPr lang="en-US" sz="2400" dirty="0"/>
+              <a:t>7. CRC Cards</a:t>
+            </a:r>
+          </a:p>
+        </p:txBody>
+      </p:sp>
+      <p:sp>
+        <p:nvSpPr>
+          <p:cNvPr id="5" name="Rectangle 4">
+            <a:extLst>
+              <a:ext uri="{FF2B5EF4-FFF2-40B4-BE49-F238E27FC236}">
+                <a16:creationId xmlns:a16="http://schemas.microsoft.com/office/drawing/2014/main" id="{21415D49-0D7B-0249-BBBF-CC5AA646B959}"/>
+              </a:ext>
+            </a:extLst>
+          </p:cNvPr>
+          <p:cNvSpPr/>
+          <p:nvPr/>
+        </p:nvSpPr>
+        <p:spPr>
+          <a:xfrm>
+            <a:off x="945930" y="1177158"/>
+            <a:ext cx="4866289" cy="3058511"/>
+          </a:xfrm>
+          <a:prstGeom prst="rect">
+            <a:avLst/>
+          </a:prstGeom>
+          <a:noFill/>
+          <a:ln w="19050">
+            <a:solidFill>
+              <a:schemeClr val="tx1"/>
+            </a:solidFill>
+          </a:ln>
+        </p:spPr>
+        <p:style>
+          <a:lnRef idx="2">
+            <a:schemeClr val="accent1">
+              <a:shade val="50000"/>
+            </a:schemeClr>
+          </a:lnRef>
+          <a:fillRef idx="1">
+            <a:schemeClr val="accent1"/>
+          </a:fillRef>
+          <a:effectRef idx="0">
+            <a:schemeClr val="accent1"/>
+          </a:effectRef>
+          <a:fontRef idx="minor">
+            <a:schemeClr val="lt1"/>
+          </a:fontRef>
+        </p:style>
+        <p:txBody>
+          <a:bodyPr rtlCol="0" anchor="ctr"/>
+          <a:lstStyle/>
+          <a:p>
+            <a:pPr algn="ctr"/>
+            <a:endParaRPr lang="en-US"/>
+          </a:p>
+        </p:txBody>
+      </p:sp>
+      <p:sp>
+        <p:nvSpPr>
+          <p:cNvPr id="6" name="TextBox 5">
+            <a:extLst>
+              <a:ext uri="{FF2B5EF4-FFF2-40B4-BE49-F238E27FC236}">
+                <a16:creationId xmlns:a16="http://schemas.microsoft.com/office/drawing/2014/main" id="{2D5B0409-95C4-F149-B0AD-BBB165ADED56}"/>
+              </a:ext>
+            </a:extLst>
+          </p:cNvPr>
+          <p:cNvSpPr txBox="1"/>
+          <p:nvPr/>
+        </p:nvSpPr>
+        <p:spPr>
+          <a:xfrm>
+            <a:off x="1051034" y="1345324"/>
+            <a:ext cx="1227387" cy="369332"/>
+          </a:xfrm>
+          <a:prstGeom prst="rect">
+            <a:avLst/>
+          </a:prstGeom>
+          <a:noFill/>
+        </p:spPr>
+        <p:txBody>
+          <a:bodyPr wrap="none" rtlCol="0">
+            <a:spAutoFit/>
+          </a:bodyPr>
+          <a:lstStyle/>
+          <a:p>
+            <a:r>
+              <a:rPr lang="en-US" dirty="0" err="1"/>
+              <a:t>PlaceDetail</a:t>
+            </a:r>
+            <a:endParaRPr lang="en-US" dirty="0"/>
+          </a:p>
+        </p:txBody>
+      </p:sp>
+      <p:sp>
+        <p:nvSpPr>
+          <p:cNvPr id="7" name="TextBox 6">
+            <a:extLst>
+              <a:ext uri="{FF2B5EF4-FFF2-40B4-BE49-F238E27FC236}">
+                <a16:creationId xmlns:a16="http://schemas.microsoft.com/office/drawing/2014/main" id="{9AA50C64-C0E6-3844-A7CB-C1F63790949F}"/>
+              </a:ext>
+            </a:extLst>
+          </p:cNvPr>
+          <p:cNvSpPr txBox="1"/>
+          <p:nvPr/>
+        </p:nvSpPr>
+        <p:spPr>
+          <a:xfrm>
+            <a:off x="1160759" y="1969964"/>
+            <a:ext cx="2643985" cy="523220"/>
+          </a:xfrm>
+          <a:prstGeom prst="rect">
+            <a:avLst/>
+          </a:prstGeom>
+          <a:noFill/>
+        </p:spPr>
+        <p:txBody>
+          <a:bodyPr wrap="square" rtlCol="0">
+            <a:spAutoFit/>
+          </a:bodyPr>
+          <a:lstStyle/>
+          <a:p>
+            <a:r>
+              <a:rPr lang="en-US" sz="1400" dirty="0"/>
+              <a:t>Show details of the place, which user Clicked</a:t>
+            </a:r>
+          </a:p>
+        </p:txBody>
+      </p:sp>
+      <p:sp>
+        <p:nvSpPr>
+          <p:cNvPr id="8" name="TextBox 7">
+            <a:extLst>
+              <a:ext uri="{FF2B5EF4-FFF2-40B4-BE49-F238E27FC236}">
+                <a16:creationId xmlns:a16="http://schemas.microsoft.com/office/drawing/2014/main" id="{E27BC7DA-0B25-0446-BBE0-95C40761C84F}"/>
+              </a:ext>
+            </a:extLst>
+          </p:cNvPr>
+          <p:cNvSpPr txBox="1"/>
+          <p:nvPr/>
+        </p:nvSpPr>
+        <p:spPr>
+          <a:xfrm>
+            <a:off x="1137428" y="3511927"/>
+            <a:ext cx="2643985" cy="523220"/>
+          </a:xfrm>
+          <a:prstGeom prst="rect">
+            <a:avLst/>
+          </a:prstGeom>
+          <a:noFill/>
+        </p:spPr>
+        <p:txBody>
+          <a:bodyPr wrap="square" rtlCol="0">
+            <a:spAutoFit/>
+          </a:bodyPr>
+          <a:lstStyle/>
+          <a:p>
+            <a:r>
+              <a:rPr lang="en-US" sz="1400" dirty="0"/>
+              <a:t>There might be no menu information.</a:t>
+            </a:r>
+          </a:p>
+        </p:txBody>
+      </p:sp>
+      <p:cxnSp>
+        <p:nvCxnSpPr>
+          <p:cNvPr id="9" name="Straight Connector 8">
+            <a:extLst>
+              <a:ext uri="{FF2B5EF4-FFF2-40B4-BE49-F238E27FC236}">
+                <a16:creationId xmlns:a16="http://schemas.microsoft.com/office/drawing/2014/main" id="{29E03135-E34D-844A-B48A-95CB12432160}"/>
+              </a:ext>
+            </a:extLst>
+          </p:cNvPr>
+          <p:cNvCxnSpPr/>
+          <p:nvPr/>
+        </p:nvCxnSpPr>
+        <p:spPr>
+          <a:xfrm>
+            <a:off x="3972910" y="1969964"/>
+            <a:ext cx="0" cy="1948079"/>
+          </a:xfrm>
+          <a:prstGeom prst="line">
+            <a:avLst/>
+          </a:prstGeom>
+          <a:ln w="12700">
+            <a:solidFill>
+              <a:schemeClr val="bg1">
+                <a:lumMod val="50000"/>
+              </a:schemeClr>
+            </a:solidFill>
+          </a:ln>
+        </p:spPr>
+        <p:style>
+          <a:lnRef idx="1">
+            <a:schemeClr val="accent1"/>
+          </a:lnRef>
+          <a:fillRef idx="0">
+            <a:schemeClr val="accent1"/>
+          </a:fillRef>
+          <a:effectRef idx="0">
+            <a:schemeClr val="accent1"/>
+          </a:effectRef>
+          <a:fontRef idx="minor">
+            <a:schemeClr val="tx1"/>
+          </a:fontRef>
+        </p:style>
+      </p:cxnSp>
+      <p:sp>
+        <p:nvSpPr>
+          <p:cNvPr id="10" name="Rectangle 9">
+            <a:extLst>
+              <a:ext uri="{FF2B5EF4-FFF2-40B4-BE49-F238E27FC236}">
+                <a16:creationId xmlns:a16="http://schemas.microsoft.com/office/drawing/2014/main" id="{AB55D310-ABEE-C548-979F-19474E603324}"/>
+              </a:ext>
+            </a:extLst>
+          </p:cNvPr>
+          <p:cNvSpPr/>
+          <p:nvPr/>
+        </p:nvSpPr>
+        <p:spPr>
+          <a:xfrm>
+            <a:off x="6321971" y="1177158"/>
+            <a:ext cx="4866289" cy="3058511"/>
+          </a:xfrm>
+          <a:prstGeom prst="rect">
+            <a:avLst/>
+          </a:prstGeom>
+          <a:noFill/>
+          <a:ln w="19050">
+            <a:solidFill>
+              <a:schemeClr val="tx1"/>
+            </a:solidFill>
+          </a:ln>
+        </p:spPr>
+        <p:style>
+          <a:lnRef idx="2">
+            <a:schemeClr val="accent1">
+              <a:shade val="50000"/>
+            </a:schemeClr>
+          </a:lnRef>
+          <a:fillRef idx="1">
+            <a:schemeClr val="accent1"/>
+          </a:fillRef>
+          <a:effectRef idx="0">
+            <a:schemeClr val="accent1"/>
+          </a:effectRef>
+          <a:fontRef idx="minor">
+            <a:schemeClr val="lt1"/>
+          </a:fontRef>
+        </p:style>
+        <p:txBody>
+          <a:bodyPr rtlCol="0" anchor="ctr"/>
+          <a:lstStyle/>
+          <a:p>
+            <a:pPr algn="ctr"/>
+            <a:endParaRPr lang="en-US"/>
+          </a:p>
+        </p:txBody>
+      </p:sp>
+      <p:sp>
+        <p:nvSpPr>
+          <p:cNvPr id="11" name="TextBox 10">
+            <a:extLst>
+              <a:ext uri="{FF2B5EF4-FFF2-40B4-BE49-F238E27FC236}">
+                <a16:creationId xmlns:a16="http://schemas.microsoft.com/office/drawing/2014/main" id="{02FE5BDA-6C16-654B-8182-816AEC2294C1}"/>
+              </a:ext>
+            </a:extLst>
+          </p:cNvPr>
+          <p:cNvSpPr txBox="1"/>
+          <p:nvPr/>
+        </p:nvSpPr>
+        <p:spPr>
+          <a:xfrm>
+            <a:off x="6427075" y="1345324"/>
+            <a:ext cx="1281441" cy="369332"/>
+          </a:xfrm>
+          <a:prstGeom prst="rect">
+            <a:avLst/>
+          </a:prstGeom>
+          <a:noFill/>
+        </p:spPr>
+        <p:txBody>
+          <a:bodyPr wrap="none" rtlCol="0">
+            <a:spAutoFit/>
+          </a:bodyPr>
+          <a:lstStyle/>
+          <a:p>
+            <a:r>
+              <a:rPr lang="en-US" dirty="0" err="1"/>
+              <a:t>TopMenues</a:t>
+            </a:r>
+            <a:endParaRPr lang="en-US" dirty="0"/>
+          </a:p>
+        </p:txBody>
+      </p:sp>
+      <p:cxnSp>
+        <p:nvCxnSpPr>
+          <p:cNvPr id="14" name="Straight Connector 13">
+            <a:extLst>
+              <a:ext uri="{FF2B5EF4-FFF2-40B4-BE49-F238E27FC236}">
+                <a16:creationId xmlns:a16="http://schemas.microsoft.com/office/drawing/2014/main" id="{3B3DBFC2-D526-074F-868F-943EB1C153CB}"/>
+              </a:ext>
+            </a:extLst>
+          </p:cNvPr>
+          <p:cNvCxnSpPr/>
+          <p:nvPr/>
+        </p:nvCxnSpPr>
+        <p:spPr>
+          <a:xfrm>
+            <a:off x="9348951" y="1969964"/>
+            <a:ext cx="0" cy="1948079"/>
+          </a:xfrm>
+          <a:prstGeom prst="line">
+            <a:avLst/>
+          </a:prstGeom>
+          <a:ln w="12700">
+            <a:solidFill>
+              <a:schemeClr val="bg1">
+                <a:lumMod val="50000"/>
+              </a:schemeClr>
+            </a:solidFill>
+          </a:ln>
+        </p:spPr>
+        <p:style>
+          <a:lnRef idx="1">
+            <a:schemeClr val="accent1"/>
+          </a:lnRef>
+          <a:fillRef idx="0">
+            <a:schemeClr val="accent1"/>
+          </a:fillRef>
+          <a:effectRef idx="0">
+            <a:schemeClr val="accent1"/>
+          </a:effectRef>
+          <a:fontRef idx="minor">
+            <a:schemeClr val="tx1"/>
+          </a:fontRef>
+        </p:style>
+      </p:cxnSp>
+      <p:sp>
+        <p:nvSpPr>
+          <p:cNvPr id="15" name="TextBox 14">
+            <a:extLst>
+              <a:ext uri="{FF2B5EF4-FFF2-40B4-BE49-F238E27FC236}">
+                <a16:creationId xmlns:a16="http://schemas.microsoft.com/office/drawing/2014/main" id="{1608539D-3779-DC4F-B8B2-0A9FA13A536B}"/>
+              </a:ext>
+            </a:extLst>
+          </p:cNvPr>
+          <p:cNvSpPr txBox="1"/>
+          <p:nvPr/>
+        </p:nvSpPr>
+        <p:spPr>
+          <a:xfrm>
+            <a:off x="4311069" y="1969964"/>
+            <a:ext cx="1166025" cy="369332"/>
+          </a:xfrm>
+          <a:prstGeom prst="rect">
+            <a:avLst/>
+          </a:prstGeom>
+          <a:noFill/>
+        </p:spPr>
+        <p:txBody>
+          <a:bodyPr wrap="none" rtlCol="0">
+            <a:spAutoFit/>
+          </a:bodyPr>
+          <a:lstStyle/>
+          <a:p>
+            <a:r>
+              <a:rPr lang="en-US" dirty="0" err="1"/>
+              <a:t>TopMenus</a:t>
+            </a:r>
+            <a:endParaRPr lang="en-US" dirty="0"/>
+          </a:p>
+        </p:txBody>
+      </p:sp>
+      <p:sp>
+        <p:nvSpPr>
+          <p:cNvPr id="18" name="TextBox 17">
+            <a:extLst>
+              <a:ext uri="{FF2B5EF4-FFF2-40B4-BE49-F238E27FC236}">
+                <a16:creationId xmlns:a16="http://schemas.microsoft.com/office/drawing/2014/main" id="{065F4FAA-A16B-2347-9848-4DE4640B9B07}"/>
+              </a:ext>
+            </a:extLst>
+          </p:cNvPr>
+          <p:cNvSpPr txBox="1"/>
+          <p:nvPr/>
+        </p:nvSpPr>
+        <p:spPr>
+          <a:xfrm>
+            <a:off x="6568965" y="2123852"/>
+            <a:ext cx="2270234" cy="738664"/>
+          </a:xfrm>
+          <a:prstGeom prst="rect">
+            <a:avLst/>
+          </a:prstGeom>
+          <a:noFill/>
+        </p:spPr>
+        <p:txBody>
+          <a:bodyPr wrap="square" rtlCol="0">
+            <a:spAutoFit/>
+          </a:bodyPr>
+          <a:lstStyle/>
+          <a:p>
+            <a:r>
+              <a:rPr lang="en-US" sz="1400" dirty="0"/>
+              <a:t>Show </a:t>
+            </a:r>
+            <a:r>
+              <a:rPr lang="en-US" sz="1400" dirty="0" err="1"/>
+              <a:t>menues</a:t>
+            </a:r>
+            <a:r>
+              <a:rPr lang="en-US" sz="1400" dirty="0"/>
+              <a:t> of the place, which are popular (e.g. list by ratings)</a:t>
+            </a:r>
+          </a:p>
+        </p:txBody>
+      </p:sp>
+    </p:spTree>
+    <p:extLst>
+      <p:ext uri="{BB962C8B-B14F-4D97-AF65-F5344CB8AC3E}">
+        <p14:creationId xmlns:p14="http://schemas.microsoft.com/office/powerpoint/2010/main" val="483839532"/>
       </p:ext>
     </p:extLst>
   </p:cSld>

</xml_diff>

<commit_message>
modify User Case Diagram(#1)
</commit_message>
<xml_diff>
--- a/Milestone#2 Reportouts/UMLDiagrams.pptx
+++ b/Milestone#2 Reportouts/UMLDiagrams.pptx
@@ -3656,14 +3656,7 @@
             <a:pPr algn="ctr"/>
             <a:r>
               <a:rPr lang="en-US" sz="1600" dirty="0"/>
-              <a:t>Search near </a:t>
-            </a:r>
-            <a:br>
-              <a:rPr lang="en-US" sz="1600" dirty="0"/>
-            </a:br>
-            <a:r>
-              <a:rPr lang="en-US" sz="1600" dirty="0"/>
-              <a:t>the place</a:t>
+              <a:t>Search Places Nearby</a:t>
             </a:r>
           </a:p>
         </p:txBody>
@@ -3996,13 +3989,8 @@
             <a:pPr algn="ctr"/>
             <a:r>
               <a:rPr lang="en-US" sz="1600" dirty="0"/>
-              <a:t>View a List of </a:t>
-            </a:r>
-            <a:r>
-              <a:rPr lang="en-US" sz="1600" dirty="0" err="1"/>
-              <a:t>Res`taurant</a:t>
-            </a:r>
-            <a:endParaRPr lang="en-US" sz="1600" dirty="0"/>
+              <a:t>View a List of Places</a:t>
+            </a:r>
           </a:p>
         </p:txBody>
       </p:sp>
@@ -4089,7 +4077,7 @@
             <a:pPr algn="ctr"/>
             <a:r>
               <a:rPr lang="en-US" sz="1600" dirty="0"/>
-              <a:t>View details on a restaurant</a:t>
+              <a:t>View details of a Place</a:t>
             </a:r>
           </a:p>
         </p:txBody>
@@ -7005,10 +6993,9 @@
           <a:lstStyle/>
           <a:p>
             <a:r>
-              <a:rPr lang="en-US"/>
+              <a:rPr lang="en-US" dirty="0"/>
               <a:t>Place Search</a:t>
             </a:r>
-            <a:endParaRPr lang="en-US" dirty="0"/>
           </a:p>
         </p:txBody>
       </p:sp>

</xml_diff>